<commit_message>
Update MadCap Flare and Microsoft Word.pptx
</commit_message>
<xml_diff>
--- a/Week16-FinalProjects/MadCap Flare and Microsoft Word.pptx
+++ b/Week16-FinalProjects/MadCap Flare and Microsoft Word.pptx
@@ -172,7 +172,7 @@
           <a:noFill/>
           <a:extLst>
             <a:ext uri="{909E8E84-426E-40dd-AFC4-6F175D3DCCD1}">
-              <a14:hiddenFill xmlns:a14="http://schemas.microsoft.com/office/drawing/2010/main" xmlns="">
+              <a14:hiddenFill xmlns="" xmlns:a14="http://schemas.microsoft.com/office/drawing/2010/main">
                 <a:solidFill>
                   <a:srgbClr val="FFFFFF"/>
                 </a:solidFill>
@@ -232,7 +232,7 @@
             </a:ln>
             <a:extLst>
               <a:ext uri="{91240B29-F687-4f45-9708-019B960494DF}">
-                <a14:hiddenLine xmlns:a14="http://schemas.microsoft.com/office/drawing/2010/main" xmlns="" w="9525">
+                <a14:hiddenLine xmlns="" xmlns:a14="http://schemas.microsoft.com/office/drawing/2010/main" w="9525">
                   <a:solidFill>
                     <a:srgbClr val="000000"/>
                   </a:solidFill>
@@ -322,7 +322,7 @@
             </a:ln>
             <a:extLst>
               <a:ext uri="{91240B29-F687-4f45-9708-019B960494DF}">
-                <a14:hiddenLine xmlns:a14="http://schemas.microsoft.com/office/drawing/2010/main" xmlns="" w="9525">
+                <a14:hiddenLine xmlns="" xmlns:a14="http://schemas.microsoft.com/office/drawing/2010/main" w="9525">
                   <a:solidFill>
                     <a:srgbClr val="000000"/>
                   </a:solidFill>
@@ -412,7 +412,7 @@
             </a:ln>
             <a:extLst>
               <a:ext uri="{91240B29-F687-4f45-9708-019B960494DF}">
-                <a14:hiddenLine xmlns:a14="http://schemas.microsoft.com/office/drawing/2010/main" xmlns="" w="9525">
+                <a14:hiddenLine xmlns="" xmlns:a14="http://schemas.microsoft.com/office/drawing/2010/main" w="9525">
                   <a:solidFill>
                     <a:srgbClr val="000000"/>
                   </a:solidFill>
@@ -446,7 +446,7 @@
             </a:ln>
             <a:extLst>
               <a:ext uri="{91240B29-F687-4f45-9708-019B960494DF}">
-                <a14:hiddenLine xmlns:a14="http://schemas.microsoft.com/office/drawing/2010/main" xmlns="" w="9525">
+                <a14:hiddenLine xmlns="" xmlns:a14="http://schemas.microsoft.com/office/drawing/2010/main" w="9525">
                   <a:solidFill>
                     <a:srgbClr val="000000"/>
                   </a:solidFill>
@@ -536,7 +536,7 @@
             </a:ln>
             <a:extLst>
               <a:ext uri="{91240B29-F687-4f45-9708-019B960494DF}">
-                <a14:hiddenLine xmlns:a14="http://schemas.microsoft.com/office/drawing/2010/main" xmlns="" w="9525">
+                <a14:hiddenLine xmlns="" xmlns:a14="http://schemas.microsoft.com/office/drawing/2010/main" w="9525">
                   <a:solidFill>
                     <a:srgbClr val="000000"/>
                   </a:solidFill>
@@ -598,7 +598,7 @@
             </a:ln>
             <a:extLst>
               <a:ext uri="{91240B29-F687-4f45-9708-019B960494DF}">
-                <a14:hiddenLine xmlns:a14="http://schemas.microsoft.com/office/drawing/2010/main" xmlns="" w="9525">
+                <a14:hiddenLine xmlns="" xmlns:a14="http://schemas.microsoft.com/office/drawing/2010/main" w="9525">
                   <a:solidFill>
                     <a:srgbClr val="000000"/>
                   </a:solidFill>
@@ -660,7 +660,7 @@
             </a:ln>
             <a:extLst>
               <a:ext uri="{91240B29-F687-4f45-9708-019B960494DF}">
-                <a14:hiddenLine xmlns:a14="http://schemas.microsoft.com/office/drawing/2010/main" xmlns="" w="9525">
+                <a14:hiddenLine xmlns="" xmlns:a14="http://schemas.microsoft.com/office/drawing/2010/main" w="9525">
                   <a:solidFill>
                     <a:srgbClr val="000000"/>
                   </a:solidFill>
@@ -750,7 +750,7 @@
             </a:ln>
             <a:extLst>
               <a:ext uri="{91240B29-F687-4f45-9708-019B960494DF}">
-                <a14:hiddenLine xmlns:a14="http://schemas.microsoft.com/office/drawing/2010/main" xmlns="" w="9525">
+                <a14:hiddenLine xmlns="" xmlns:a14="http://schemas.microsoft.com/office/drawing/2010/main" w="9525">
                   <a:solidFill>
                     <a:srgbClr val="000000"/>
                   </a:solidFill>
@@ -812,7 +812,7 @@
             </a:ln>
             <a:extLst>
               <a:ext uri="{91240B29-F687-4f45-9708-019B960494DF}">
-                <a14:hiddenLine xmlns:a14="http://schemas.microsoft.com/office/drawing/2010/main" xmlns="" w="9525">
+                <a14:hiddenLine xmlns="" xmlns:a14="http://schemas.microsoft.com/office/drawing/2010/main" w="9525">
                   <a:solidFill>
                     <a:srgbClr val="000000"/>
                   </a:solidFill>
@@ -874,7 +874,7 @@
             </a:ln>
             <a:extLst>
               <a:ext uri="{91240B29-F687-4f45-9708-019B960494DF}">
-                <a14:hiddenLine xmlns:a14="http://schemas.microsoft.com/office/drawing/2010/main" xmlns="" w="9525">
+                <a14:hiddenLine xmlns="" xmlns:a14="http://schemas.microsoft.com/office/drawing/2010/main" w="9525">
                   <a:solidFill>
                     <a:srgbClr val="000000"/>
                   </a:solidFill>
@@ -964,7 +964,7 @@
             </a:ln>
             <a:extLst>
               <a:ext uri="{91240B29-F687-4f45-9708-019B960494DF}">
-                <a14:hiddenLine xmlns:a14="http://schemas.microsoft.com/office/drawing/2010/main" xmlns="" w="9525">
+                <a14:hiddenLine xmlns="" xmlns:a14="http://schemas.microsoft.com/office/drawing/2010/main" w="9525">
                   <a:solidFill>
                     <a:srgbClr val="000000"/>
                   </a:solidFill>
@@ -1054,7 +1054,7 @@
             </a:ln>
             <a:extLst>
               <a:ext uri="{91240B29-F687-4f45-9708-019B960494DF}">
-                <a14:hiddenLine xmlns:a14="http://schemas.microsoft.com/office/drawing/2010/main" xmlns="" w="9525">
+                <a14:hiddenLine xmlns="" xmlns:a14="http://schemas.microsoft.com/office/drawing/2010/main" w="9525">
                   <a:solidFill>
                     <a:srgbClr val="000000"/>
                   </a:solidFill>
@@ -1116,7 +1116,7 @@
             </a:ln>
             <a:extLst>
               <a:ext uri="{91240B29-F687-4f45-9708-019B960494DF}">
-                <a14:hiddenLine xmlns:a14="http://schemas.microsoft.com/office/drawing/2010/main" xmlns="" w="9525">
+                <a14:hiddenLine xmlns="" xmlns:a14="http://schemas.microsoft.com/office/drawing/2010/main" w="9525">
                   <a:solidFill>
                     <a:srgbClr val="000000"/>
                   </a:solidFill>
@@ -1226,7 +1226,7 @@
             </a:ln>
             <a:extLst>
               <a:ext uri="{91240B29-F687-4f45-9708-019B960494DF}">
-                <a14:hiddenLine xmlns:a14="http://schemas.microsoft.com/office/drawing/2010/main" xmlns="" w="9525">
+                <a14:hiddenLine xmlns="" xmlns:a14="http://schemas.microsoft.com/office/drawing/2010/main" w="9525">
                   <a:solidFill>
                     <a:srgbClr val="000000"/>
                   </a:solidFill>
@@ -1288,7 +1288,7 @@
             </a:ln>
             <a:extLst>
               <a:ext uri="{91240B29-F687-4f45-9708-019B960494DF}">
-                <a14:hiddenLine xmlns:a14="http://schemas.microsoft.com/office/drawing/2010/main" xmlns="" w="9525">
+                <a14:hiddenLine xmlns="" xmlns:a14="http://schemas.microsoft.com/office/drawing/2010/main" w="9525">
                   <a:solidFill>
                     <a:srgbClr val="000000"/>
                   </a:solidFill>
@@ -1378,7 +1378,7 @@
             </a:ln>
             <a:extLst>
               <a:ext uri="{91240B29-F687-4f45-9708-019B960494DF}">
-                <a14:hiddenLine xmlns:a14="http://schemas.microsoft.com/office/drawing/2010/main" xmlns="" w="9525">
+                <a14:hiddenLine xmlns="" xmlns:a14="http://schemas.microsoft.com/office/drawing/2010/main" w="9525">
                   <a:solidFill>
                     <a:srgbClr val="000000"/>
                   </a:solidFill>
@@ -1468,7 +1468,7 @@
             </a:ln>
             <a:extLst>
               <a:ext uri="{91240B29-F687-4f45-9708-019B960494DF}">
-                <a14:hiddenLine xmlns:a14="http://schemas.microsoft.com/office/drawing/2010/main" xmlns="" w="9525">
+                <a14:hiddenLine xmlns="" xmlns:a14="http://schemas.microsoft.com/office/drawing/2010/main" w="9525">
                   <a:solidFill>
                     <a:srgbClr val="000000"/>
                   </a:solidFill>
@@ -1530,7 +1530,7 @@
             </a:ln>
             <a:extLst>
               <a:ext uri="{91240B29-F687-4f45-9708-019B960494DF}">
-                <a14:hiddenLine xmlns:a14="http://schemas.microsoft.com/office/drawing/2010/main" xmlns="" w="9525">
+                <a14:hiddenLine xmlns="" xmlns:a14="http://schemas.microsoft.com/office/drawing/2010/main" w="9525">
                   <a:solidFill>
                     <a:srgbClr val="000000"/>
                   </a:solidFill>
@@ -1620,7 +1620,7 @@
             </a:ln>
             <a:extLst>
               <a:ext uri="{91240B29-F687-4f45-9708-019B960494DF}">
-                <a14:hiddenLine xmlns:a14="http://schemas.microsoft.com/office/drawing/2010/main" xmlns="" w="9525">
+                <a14:hiddenLine xmlns="" xmlns:a14="http://schemas.microsoft.com/office/drawing/2010/main" w="9525">
                   <a:solidFill>
                     <a:srgbClr val="000000"/>
                   </a:solidFill>
@@ -1710,7 +1710,7 @@
             </a:ln>
             <a:extLst>
               <a:ext uri="{91240B29-F687-4f45-9708-019B960494DF}">
-                <a14:hiddenLine xmlns:a14="http://schemas.microsoft.com/office/drawing/2010/main" xmlns="" w="9525">
+                <a14:hiddenLine xmlns="" xmlns:a14="http://schemas.microsoft.com/office/drawing/2010/main" w="9525">
                   <a:solidFill>
                     <a:srgbClr val="000000"/>
                   </a:solidFill>
@@ -1766,7 +1766,7 @@
             </a:ln>
             <a:extLst>
               <a:ext uri="{91240B29-F687-4f45-9708-019B960494DF}">
-                <a14:hiddenLine xmlns:a14="http://schemas.microsoft.com/office/drawing/2010/main" xmlns="" w="9525">
+                <a14:hiddenLine xmlns="" xmlns:a14="http://schemas.microsoft.com/office/drawing/2010/main" w="9525">
                   <a:solidFill>
                     <a:srgbClr val="000000"/>
                   </a:solidFill>
@@ -1856,7 +1856,7 @@
             </a:ln>
             <a:extLst>
               <a:ext uri="{91240B29-F687-4f45-9708-019B960494DF}">
-                <a14:hiddenLine xmlns:a14="http://schemas.microsoft.com/office/drawing/2010/main" xmlns="" w="9525">
+                <a14:hiddenLine xmlns="" xmlns:a14="http://schemas.microsoft.com/office/drawing/2010/main" w="9525">
                   <a:solidFill>
                     <a:srgbClr val="000000"/>
                   </a:solidFill>
@@ -1912,7 +1912,7 @@
             </a:ln>
             <a:extLst>
               <a:ext uri="{91240B29-F687-4f45-9708-019B960494DF}">
-                <a14:hiddenLine xmlns:a14="http://schemas.microsoft.com/office/drawing/2010/main" xmlns="" w="9525">
+                <a14:hiddenLine xmlns="" xmlns:a14="http://schemas.microsoft.com/office/drawing/2010/main" w="9525">
                   <a:solidFill>
                     <a:srgbClr val="000000"/>
                   </a:solidFill>
@@ -2002,7 +2002,7 @@
             </a:ln>
             <a:extLst>
               <a:ext uri="{91240B29-F687-4f45-9708-019B960494DF}">
-                <a14:hiddenLine xmlns:a14="http://schemas.microsoft.com/office/drawing/2010/main" xmlns="" w="9525">
+                <a14:hiddenLine xmlns="" xmlns:a14="http://schemas.microsoft.com/office/drawing/2010/main" w="9525">
                   <a:solidFill>
                     <a:srgbClr val="000000"/>
                   </a:solidFill>
@@ -2070,7 +2070,7 @@
             </a:ln>
             <a:extLst>
               <a:ext uri="{91240B29-F687-4f45-9708-019B960494DF}">
-                <a14:hiddenLine xmlns:a14="http://schemas.microsoft.com/office/drawing/2010/main" xmlns="" w="9525">
+                <a14:hiddenLine xmlns="" xmlns:a14="http://schemas.microsoft.com/office/drawing/2010/main" w="9525">
                   <a:solidFill>
                     <a:srgbClr val="000000"/>
                   </a:solidFill>
@@ -2160,7 +2160,7 @@
             </a:ln>
             <a:extLst>
               <a:ext uri="{91240B29-F687-4f45-9708-019B960494DF}">
-                <a14:hiddenLine xmlns:a14="http://schemas.microsoft.com/office/drawing/2010/main" xmlns="" w="9525">
+                <a14:hiddenLine xmlns="" xmlns:a14="http://schemas.microsoft.com/office/drawing/2010/main" w="9525">
                   <a:solidFill>
                     <a:srgbClr val="000000"/>
                   </a:solidFill>
@@ -2228,7 +2228,7 @@
             </a:ln>
             <a:extLst>
               <a:ext uri="{91240B29-F687-4f45-9708-019B960494DF}">
-                <a14:hiddenLine xmlns:a14="http://schemas.microsoft.com/office/drawing/2010/main" xmlns="" w="9525">
+                <a14:hiddenLine xmlns="" xmlns:a14="http://schemas.microsoft.com/office/drawing/2010/main" w="9525">
                   <a:solidFill>
                     <a:srgbClr val="000000"/>
                   </a:solidFill>
@@ -2318,7 +2318,7 @@
             </a:ln>
             <a:extLst>
               <a:ext uri="{91240B29-F687-4f45-9708-019B960494DF}">
-                <a14:hiddenLine xmlns:a14="http://schemas.microsoft.com/office/drawing/2010/main" xmlns="" w="9525">
+                <a14:hiddenLine xmlns="" xmlns:a14="http://schemas.microsoft.com/office/drawing/2010/main" w="9525">
                   <a:solidFill>
                     <a:srgbClr val="000000"/>
                   </a:solidFill>
@@ -2352,7 +2352,7 @@
             </a:ln>
             <a:extLst>
               <a:ext uri="{91240B29-F687-4f45-9708-019B960494DF}">
-                <a14:hiddenLine xmlns:a14="http://schemas.microsoft.com/office/drawing/2010/main" xmlns="" w="9525">
+                <a14:hiddenLine xmlns="" xmlns:a14="http://schemas.microsoft.com/office/drawing/2010/main" w="9525">
                   <a:solidFill>
                     <a:srgbClr val="000000"/>
                   </a:solidFill>
@@ -2442,7 +2442,7 @@
             </a:ln>
             <a:extLst>
               <a:ext uri="{91240B29-F687-4f45-9708-019B960494DF}">
-                <a14:hiddenLine xmlns:a14="http://schemas.microsoft.com/office/drawing/2010/main" xmlns="" w="9525">
+                <a14:hiddenLine xmlns="" xmlns:a14="http://schemas.microsoft.com/office/drawing/2010/main" w="9525">
                   <a:solidFill>
                     <a:srgbClr val="000000"/>
                   </a:solidFill>
@@ -2504,7 +2504,7 @@
             </a:ln>
             <a:extLst>
               <a:ext uri="{91240B29-F687-4f45-9708-019B960494DF}">
-                <a14:hiddenLine xmlns:a14="http://schemas.microsoft.com/office/drawing/2010/main" xmlns="" w="9525">
+                <a14:hiddenLine xmlns="" xmlns:a14="http://schemas.microsoft.com/office/drawing/2010/main" w="9525">
                   <a:solidFill>
                     <a:srgbClr val="000000"/>
                   </a:solidFill>
@@ -2566,7 +2566,7 @@
             </a:ln>
             <a:extLst>
               <a:ext uri="{91240B29-F687-4f45-9708-019B960494DF}">
-                <a14:hiddenLine xmlns:a14="http://schemas.microsoft.com/office/drawing/2010/main" xmlns="" w="9525">
+                <a14:hiddenLine xmlns="" xmlns:a14="http://schemas.microsoft.com/office/drawing/2010/main" w="9525">
                   <a:solidFill>
                     <a:srgbClr val="000000"/>
                   </a:solidFill>
@@ -2656,7 +2656,7 @@
             </a:ln>
             <a:extLst>
               <a:ext uri="{91240B29-F687-4f45-9708-019B960494DF}">
-                <a14:hiddenLine xmlns:a14="http://schemas.microsoft.com/office/drawing/2010/main" xmlns="" w="9525">
+                <a14:hiddenLine xmlns="" xmlns:a14="http://schemas.microsoft.com/office/drawing/2010/main" w="9525">
                   <a:solidFill>
                     <a:srgbClr val="000000"/>
                   </a:solidFill>
@@ -2724,7 +2724,7 @@
             </a:ln>
             <a:extLst>
               <a:ext uri="{91240B29-F687-4f45-9708-019B960494DF}">
-                <a14:hiddenLine xmlns:a14="http://schemas.microsoft.com/office/drawing/2010/main" xmlns="" w="9525">
+                <a14:hiddenLine xmlns="" xmlns:a14="http://schemas.microsoft.com/office/drawing/2010/main" w="9525">
                   <a:solidFill>
                     <a:srgbClr val="000000"/>
                   </a:solidFill>
@@ -2786,7 +2786,7 @@
             </a:ln>
             <a:extLst>
               <a:ext uri="{91240B29-F687-4f45-9708-019B960494DF}">
-                <a14:hiddenLine xmlns:a14="http://schemas.microsoft.com/office/drawing/2010/main" xmlns="" w="9525">
+                <a14:hiddenLine xmlns="" xmlns:a14="http://schemas.microsoft.com/office/drawing/2010/main" w="9525">
                   <a:solidFill>
                     <a:srgbClr val="000000"/>
                   </a:solidFill>
@@ -2876,7 +2876,7 @@
             </a:ln>
             <a:extLst>
               <a:ext uri="{91240B29-F687-4f45-9708-019B960494DF}">
-                <a14:hiddenLine xmlns:a14="http://schemas.microsoft.com/office/drawing/2010/main" xmlns="" w="9525">
+                <a14:hiddenLine xmlns="" xmlns:a14="http://schemas.microsoft.com/office/drawing/2010/main" w="9525">
                   <a:solidFill>
                     <a:srgbClr val="000000"/>
                   </a:solidFill>
@@ -2938,7 +2938,7 @@
             </a:ln>
             <a:extLst>
               <a:ext uri="{91240B29-F687-4f45-9708-019B960494DF}">
-                <a14:hiddenLine xmlns:a14="http://schemas.microsoft.com/office/drawing/2010/main" xmlns="" w="9525">
+                <a14:hiddenLine xmlns="" xmlns:a14="http://schemas.microsoft.com/office/drawing/2010/main" w="9525">
                   <a:solidFill>
                     <a:srgbClr val="000000"/>
                   </a:solidFill>
@@ -3028,7 +3028,7 @@
             </a:ln>
             <a:extLst>
               <a:ext uri="{91240B29-F687-4f45-9708-019B960494DF}">
-                <a14:hiddenLine xmlns:a14="http://schemas.microsoft.com/office/drawing/2010/main" xmlns="" w="9525">
+                <a14:hiddenLine xmlns="" xmlns:a14="http://schemas.microsoft.com/office/drawing/2010/main" w="9525">
                   <a:solidFill>
                     <a:srgbClr val="000000"/>
                   </a:solidFill>
@@ -3090,7 +3090,7 @@
             </a:ln>
             <a:extLst>
               <a:ext uri="{91240B29-F687-4f45-9708-019B960494DF}">
-                <a14:hiddenLine xmlns:a14="http://schemas.microsoft.com/office/drawing/2010/main" xmlns="" w="9525">
+                <a14:hiddenLine xmlns="" xmlns:a14="http://schemas.microsoft.com/office/drawing/2010/main" w="9525">
                   <a:solidFill>
                     <a:srgbClr val="000000"/>
                   </a:solidFill>
@@ -3180,7 +3180,7 @@
             </a:ln>
             <a:extLst>
               <a:ext uri="{91240B29-F687-4f45-9708-019B960494DF}">
-                <a14:hiddenLine xmlns:a14="http://schemas.microsoft.com/office/drawing/2010/main" xmlns="" w="9525">
+                <a14:hiddenLine xmlns="" xmlns:a14="http://schemas.microsoft.com/office/drawing/2010/main" w="9525">
                   <a:solidFill>
                     <a:srgbClr val="000000"/>
                   </a:solidFill>
@@ -3214,7 +3214,7 @@
             </a:ln>
             <a:extLst>
               <a:ext uri="{91240B29-F687-4f45-9708-019B960494DF}">
-                <a14:hiddenLine xmlns:a14="http://schemas.microsoft.com/office/drawing/2010/main" xmlns="" w="9525">
+                <a14:hiddenLine xmlns="" xmlns:a14="http://schemas.microsoft.com/office/drawing/2010/main" w="9525">
                   <a:solidFill>
                     <a:srgbClr val="000000"/>
                   </a:solidFill>
@@ -3279,7 +3279,7 @@
             </a:ln>
             <a:extLst>
               <a:ext uri="{91240B29-F687-4f45-9708-019B960494DF}">
-                <a14:hiddenLine xmlns:a14="http://schemas.microsoft.com/office/drawing/2010/main" xmlns="" w="9525">
+                <a14:hiddenLine xmlns="" xmlns:a14="http://schemas.microsoft.com/office/drawing/2010/main" w="9525">
                   <a:solidFill>
                     <a:srgbClr val="000000"/>
                   </a:solidFill>
@@ -3369,7 +3369,7 @@
             </a:ln>
             <a:extLst>
               <a:ext uri="{91240B29-F687-4f45-9708-019B960494DF}">
-                <a14:hiddenLine xmlns:a14="http://schemas.microsoft.com/office/drawing/2010/main" xmlns="" w="9525">
+                <a14:hiddenLine xmlns="" xmlns:a14="http://schemas.microsoft.com/office/drawing/2010/main" w="9525">
                   <a:solidFill>
                     <a:srgbClr val="000000"/>
                   </a:solidFill>
@@ -3431,7 +3431,7 @@
             </a:ln>
             <a:extLst>
               <a:ext uri="{91240B29-F687-4f45-9708-019B960494DF}">
-                <a14:hiddenLine xmlns:a14="http://schemas.microsoft.com/office/drawing/2010/main" xmlns="" w="9525">
+                <a14:hiddenLine xmlns="" xmlns:a14="http://schemas.microsoft.com/office/drawing/2010/main" w="9525">
                   <a:solidFill>
                     <a:srgbClr val="000000"/>
                   </a:solidFill>
@@ -3521,7 +3521,7 @@
             </a:ln>
             <a:extLst>
               <a:ext uri="{91240B29-F687-4f45-9708-019B960494DF}">
-                <a14:hiddenLine xmlns:a14="http://schemas.microsoft.com/office/drawing/2010/main" xmlns="" w="9525">
+                <a14:hiddenLine xmlns="" xmlns:a14="http://schemas.microsoft.com/office/drawing/2010/main" w="9525">
                   <a:solidFill>
                     <a:srgbClr val="000000"/>
                   </a:solidFill>
@@ -3611,7 +3611,7 @@
             </a:ln>
             <a:extLst>
               <a:ext uri="{91240B29-F687-4f45-9708-019B960494DF}">
-                <a14:hiddenLine xmlns:a14="http://schemas.microsoft.com/office/drawing/2010/main" xmlns="" w="9525">
+                <a14:hiddenLine xmlns="" xmlns:a14="http://schemas.microsoft.com/office/drawing/2010/main" w="9525">
                   <a:solidFill>
                     <a:srgbClr val="000000"/>
                   </a:solidFill>
@@ -3676,7 +3676,7 @@
             </a:ln>
             <a:extLst>
               <a:ext uri="{91240B29-F687-4f45-9708-019B960494DF}">
-                <a14:hiddenLine xmlns:a14="http://schemas.microsoft.com/office/drawing/2010/main" xmlns="" w="9525">
+                <a14:hiddenLine xmlns="" xmlns:a14="http://schemas.microsoft.com/office/drawing/2010/main" w="9525">
                   <a:solidFill>
                     <a:srgbClr val="000000"/>
                   </a:solidFill>
@@ -3738,7 +3738,7 @@
             </a:ln>
             <a:extLst>
               <a:ext uri="{91240B29-F687-4f45-9708-019B960494DF}">
-                <a14:hiddenLine xmlns:a14="http://schemas.microsoft.com/office/drawing/2010/main" xmlns="" w="9525">
+                <a14:hiddenLine xmlns="" xmlns:a14="http://schemas.microsoft.com/office/drawing/2010/main" w="9525">
                   <a:solidFill>
                     <a:srgbClr val="000000"/>
                   </a:solidFill>
@@ -3828,7 +3828,7 @@
             </a:ln>
             <a:extLst>
               <a:ext uri="{91240B29-F687-4f45-9708-019B960494DF}">
-                <a14:hiddenLine xmlns:a14="http://schemas.microsoft.com/office/drawing/2010/main" xmlns="" w="9525">
+                <a14:hiddenLine xmlns="" xmlns:a14="http://schemas.microsoft.com/office/drawing/2010/main" w="9525">
                   <a:solidFill>
                     <a:srgbClr val="000000"/>
                   </a:solidFill>
@@ -3918,7 +3918,7 @@
             </a:ln>
             <a:extLst>
               <a:ext uri="{91240B29-F687-4f45-9708-019B960494DF}">
-                <a14:hiddenLine xmlns:a14="http://schemas.microsoft.com/office/drawing/2010/main" xmlns="" w="9525">
+                <a14:hiddenLine xmlns="" xmlns:a14="http://schemas.microsoft.com/office/drawing/2010/main" w="9525">
                   <a:solidFill>
                     <a:srgbClr val="000000"/>
                   </a:solidFill>
@@ -3980,7 +3980,7 @@
             </a:ln>
             <a:extLst>
               <a:ext uri="{91240B29-F687-4f45-9708-019B960494DF}">
-                <a14:hiddenLine xmlns:a14="http://schemas.microsoft.com/office/drawing/2010/main" xmlns="" w="9525">
+                <a14:hiddenLine xmlns="" xmlns:a14="http://schemas.microsoft.com/office/drawing/2010/main" w="9525">
                   <a:solidFill>
                     <a:srgbClr val="000000"/>
                   </a:solidFill>
@@ -4100,7 +4100,7 @@
             </a:ln>
             <a:extLst>
               <a:ext uri="{91240B29-F687-4f45-9708-019B960494DF}">
-                <a14:hiddenLine xmlns:a14="http://schemas.microsoft.com/office/drawing/2010/main" xmlns="" w="9525">
+                <a14:hiddenLine xmlns="" xmlns:a14="http://schemas.microsoft.com/office/drawing/2010/main" w="9525">
                   <a:solidFill>
                     <a:srgbClr val="000000"/>
                   </a:solidFill>
@@ -4168,7 +4168,7 @@
             </a:ln>
             <a:extLst>
               <a:ext uri="{91240B29-F687-4f45-9708-019B960494DF}">
-                <a14:hiddenLine xmlns:a14="http://schemas.microsoft.com/office/drawing/2010/main" xmlns="" w="9525">
+                <a14:hiddenLine xmlns="" xmlns:a14="http://schemas.microsoft.com/office/drawing/2010/main" w="9525">
                   <a:solidFill>
                     <a:srgbClr val="000000"/>
                   </a:solidFill>
@@ -4258,7 +4258,7 @@
             </a:ln>
             <a:extLst>
               <a:ext uri="{91240B29-F687-4f45-9708-019B960494DF}">
-                <a14:hiddenLine xmlns:a14="http://schemas.microsoft.com/office/drawing/2010/main" xmlns="" w="9525">
+                <a14:hiddenLine xmlns="" xmlns:a14="http://schemas.microsoft.com/office/drawing/2010/main" w="9525">
                   <a:solidFill>
                     <a:srgbClr val="000000"/>
                   </a:solidFill>
@@ -9097,7 +9097,7 @@
           <a:noFill/>
           <a:extLst>
             <a:ext uri="{909E8E84-426E-40dd-AFC4-6F175D3DCCD1}">
-              <a14:hiddenFill xmlns:a14="http://schemas.microsoft.com/office/drawing/2010/main" xmlns="">
+              <a14:hiddenFill xmlns="" xmlns:a14="http://schemas.microsoft.com/office/drawing/2010/main">
                 <a:solidFill>
                   <a:srgbClr val="FFFFFF"/>
                 </a:solidFill>
@@ -9171,7 +9171,7 @@
               </a:ln>
               <a:extLst>
                 <a:ext uri="{91240B29-F687-4f45-9708-019B960494DF}">
-                  <a14:hiddenLine xmlns:a14="http://schemas.microsoft.com/office/drawing/2010/main" xmlns="" w="9525">
+                  <a14:hiddenLine xmlns="" xmlns:a14="http://schemas.microsoft.com/office/drawing/2010/main" w="9525">
                     <a:solidFill>
                       <a:srgbClr val="000000"/>
                     </a:solidFill>
@@ -9261,7 +9261,7 @@
               </a:ln>
               <a:extLst>
                 <a:ext uri="{91240B29-F687-4f45-9708-019B960494DF}">
-                  <a14:hiddenLine xmlns:a14="http://schemas.microsoft.com/office/drawing/2010/main" xmlns="" w="9525">
+                  <a14:hiddenLine xmlns="" xmlns:a14="http://schemas.microsoft.com/office/drawing/2010/main" w="9525">
                     <a:solidFill>
                       <a:srgbClr val="000000"/>
                     </a:solidFill>
@@ -9351,7 +9351,7 @@
               </a:ln>
               <a:extLst>
                 <a:ext uri="{91240B29-F687-4f45-9708-019B960494DF}">
-                  <a14:hiddenLine xmlns:a14="http://schemas.microsoft.com/office/drawing/2010/main" xmlns="" w="9525">
+                  <a14:hiddenLine xmlns="" xmlns:a14="http://schemas.microsoft.com/office/drawing/2010/main" w="9525">
                     <a:solidFill>
                       <a:srgbClr val="000000"/>
                     </a:solidFill>
@@ -9413,7 +9413,7 @@
               </a:ln>
               <a:extLst>
                 <a:ext uri="{91240B29-F687-4f45-9708-019B960494DF}">
-                  <a14:hiddenLine xmlns:a14="http://schemas.microsoft.com/office/drawing/2010/main" xmlns="" w="9525">
+                  <a14:hiddenLine xmlns="" xmlns:a14="http://schemas.microsoft.com/office/drawing/2010/main" w="9525">
                     <a:solidFill>
                       <a:srgbClr val="000000"/>
                     </a:solidFill>
@@ -9503,7 +9503,7 @@
               </a:ln>
               <a:extLst>
                 <a:ext uri="{91240B29-F687-4f45-9708-019B960494DF}">
-                  <a14:hiddenLine xmlns:a14="http://schemas.microsoft.com/office/drawing/2010/main" xmlns="" w="9525">
+                  <a14:hiddenLine xmlns="" xmlns:a14="http://schemas.microsoft.com/office/drawing/2010/main" w="9525">
                     <a:solidFill>
                       <a:srgbClr val="000000"/>
                     </a:solidFill>
@@ -9565,7 +9565,7 @@
               </a:ln>
               <a:extLst>
                 <a:ext uri="{91240B29-F687-4f45-9708-019B960494DF}">
-                  <a14:hiddenLine xmlns:a14="http://schemas.microsoft.com/office/drawing/2010/main" xmlns="" w="9525">
+                  <a14:hiddenLine xmlns="" xmlns:a14="http://schemas.microsoft.com/office/drawing/2010/main" w="9525">
                     <a:solidFill>
                       <a:srgbClr val="000000"/>
                     </a:solidFill>
@@ -9627,7 +9627,7 @@
               </a:ln>
               <a:extLst>
                 <a:ext uri="{91240B29-F687-4f45-9708-019B960494DF}">
-                  <a14:hiddenLine xmlns:a14="http://schemas.microsoft.com/office/drawing/2010/main" xmlns="" w="9525">
+                  <a14:hiddenLine xmlns="" xmlns:a14="http://schemas.microsoft.com/office/drawing/2010/main" w="9525">
                     <a:solidFill>
                       <a:srgbClr val="000000"/>
                     </a:solidFill>
@@ -9717,7 +9717,7 @@
               </a:ln>
               <a:extLst>
                 <a:ext uri="{91240B29-F687-4f45-9708-019B960494DF}">
-                  <a14:hiddenLine xmlns:a14="http://schemas.microsoft.com/office/drawing/2010/main" xmlns="" w="9525">
+                  <a14:hiddenLine xmlns="" xmlns:a14="http://schemas.microsoft.com/office/drawing/2010/main" w="9525">
                     <a:solidFill>
                       <a:srgbClr val="000000"/>
                     </a:solidFill>
@@ -9807,7 +9807,7 @@
               </a:ln>
               <a:extLst>
                 <a:ext uri="{91240B29-F687-4f45-9708-019B960494DF}">
-                  <a14:hiddenLine xmlns:a14="http://schemas.microsoft.com/office/drawing/2010/main" xmlns="" w="9525">
+                  <a14:hiddenLine xmlns="" xmlns:a14="http://schemas.microsoft.com/office/drawing/2010/main" w="9525">
                     <a:solidFill>
                       <a:srgbClr val="000000"/>
                     </a:solidFill>
@@ -9869,7 +9869,7 @@
               </a:ln>
               <a:extLst>
                 <a:ext uri="{91240B29-F687-4f45-9708-019B960494DF}">
-                  <a14:hiddenLine xmlns:a14="http://schemas.microsoft.com/office/drawing/2010/main" xmlns="" w="9525">
+                  <a14:hiddenLine xmlns="" xmlns:a14="http://schemas.microsoft.com/office/drawing/2010/main" w="9525">
                     <a:solidFill>
                       <a:srgbClr val="000000"/>
                     </a:solidFill>
@@ -9979,7 +9979,7 @@
               </a:ln>
               <a:extLst>
                 <a:ext uri="{91240B29-F687-4f45-9708-019B960494DF}">
-                  <a14:hiddenLine xmlns:a14="http://schemas.microsoft.com/office/drawing/2010/main" xmlns="" w="9525">
+                  <a14:hiddenLine xmlns="" xmlns:a14="http://schemas.microsoft.com/office/drawing/2010/main" w="9525">
                     <a:solidFill>
                       <a:srgbClr val="000000"/>
                     </a:solidFill>
@@ -10063,7 +10063,7 @@
               </a:ln>
               <a:extLst>
                 <a:ext uri="{91240B29-F687-4f45-9708-019B960494DF}">
-                  <a14:hiddenLine xmlns:a14="http://schemas.microsoft.com/office/drawing/2010/main" xmlns="" w="9525">
+                  <a14:hiddenLine xmlns="" xmlns:a14="http://schemas.microsoft.com/office/drawing/2010/main" w="9525">
                     <a:solidFill>
                       <a:srgbClr val="000000"/>
                     </a:solidFill>
@@ -10125,7 +10125,7 @@
               </a:ln>
               <a:extLst>
                 <a:ext uri="{91240B29-F687-4f45-9708-019B960494DF}">
-                  <a14:hiddenLine xmlns:a14="http://schemas.microsoft.com/office/drawing/2010/main" xmlns="" w="9525">
+                  <a14:hiddenLine xmlns="" xmlns:a14="http://schemas.microsoft.com/office/drawing/2010/main" w="9525">
                     <a:solidFill>
                       <a:srgbClr val="000000"/>
                     </a:solidFill>
@@ -10187,7 +10187,7 @@
               </a:ln>
               <a:extLst>
                 <a:ext uri="{91240B29-F687-4f45-9708-019B960494DF}">
-                  <a14:hiddenLine xmlns:a14="http://schemas.microsoft.com/office/drawing/2010/main" xmlns="" w="9525">
+                  <a14:hiddenLine xmlns="" xmlns:a14="http://schemas.microsoft.com/office/drawing/2010/main" w="9525">
                     <a:solidFill>
                       <a:srgbClr val="000000"/>
                     </a:solidFill>
@@ -10277,7 +10277,7 @@
               </a:ln>
               <a:extLst>
                 <a:ext uri="{91240B29-F687-4f45-9708-019B960494DF}">
-                  <a14:hiddenLine xmlns:a14="http://schemas.microsoft.com/office/drawing/2010/main" xmlns="" w="9525">
+                  <a14:hiddenLine xmlns="" xmlns:a14="http://schemas.microsoft.com/office/drawing/2010/main" w="9525">
                     <a:solidFill>
                       <a:srgbClr val="000000"/>
                     </a:solidFill>
@@ -10311,7 +10311,7 @@
               </a:ln>
               <a:extLst>
                 <a:ext uri="{91240B29-F687-4f45-9708-019B960494DF}">
-                  <a14:hiddenLine xmlns:a14="http://schemas.microsoft.com/office/drawing/2010/main" xmlns="" w="9525">
+                  <a14:hiddenLine xmlns="" xmlns:a14="http://schemas.microsoft.com/office/drawing/2010/main" w="9525">
                     <a:solidFill>
                       <a:srgbClr val="000000"/>
                     </a:solidFill>
@@ -10376,7 +10376,7 @@
               </a:ln>
               <a:extLst>
                 <a:ext uri="{91240B29-F687-4f45-9708-019B960494DF}">
-                  <a14:hiddenLine xmlns:a14="http://schemas.microsoft.com/office/drawing/2010/main" xmlns="" w="9525">
+                  <a14:hiddenLine xmlns="" xmlns:a14="http://schemas.microsoft.com/office/drawing/2010/main" w="9525">
                     <a:solidFill>
                       <a:srgbClr val="000000"/>
                     </a:solidFill>
@@ -10466,7 +10466,7 @@
               </a:ln>
               <a:extLst>
                 <a:ext uri="{91240B29-F687-4f45-9708-019B960494DF}">
-                  <a14:hiddenLine xmlns:a14="http://schemas.microsoft.com/office/drawing/2010/main" xmlns="" w="9525">
+                  <a14:hiddenLine xmlns="" xmlns:a14="http://schemas.microsoft.com/office/drawing/2010/main" w="9525">
                     <a:solidFill>
                       <a:srgbClr val="000000"/>
                     </a:solidFill>
@@ -10528,7 +10528,7 @@
               </a:ln>
               <a:extLst>
                 <a:ext uri="{91240B29-F687-4f45-9708-019B960494DF}">
-                  <a14:hiddenLine xmlns:a14="http://schemas.microsoft.com/office/drawing/2010/main" xmlns="" w="9525">
+                  <a14:hiddenLine xmlns="" xmlns:a14="http://schemas.microsoft.com/office/drawing/2010/main" w="9525">
                     <a:solidFill>
                       <a:srgbClr val="000000"/>
                     </a:solidFill>
@@ -10618,7 +10618,7 @@
               </a:ln>
               <a:extLst>
                 <a:ext uri="{91240B29-F687-4f45-9708-019B960494DF}">
-                  <a14:hiddenLine xmlns:a14="http://schemas.microsoft.com/office/drawing/2010/main" xmlns="" w="9525">
+                  <a14:hiddenLine xmlns="" xmlns:a14="http://schemas.microsoft.com/office/drawing/2010/main" w="9525">
                     <a:solidFill>
                       <a:srgbClr val="000000"/>
                     </a:solidFill>
@@ -10683,7 +10683,7 @@
               </a:ln>
               <a:extLst>
                 <a:ext uri="{91240B29-F687-4f45-9708-019B960494DF}">
-                  <a14:hiddenLine xmlns:a14="http://schemas.microsoft.com/office/drawing/2010/main" xmlns="" w="9525">
+                  <a14:hiddenLine xmlns="" xmlns:a14="http://schemas.microsoft.com/office/drawing/2010/main" w="9525">
                     <a:solidFill>
                       <a:srgbClr val="000000"/>
                     </a:solidFill>
@@ -10745,7 +10745,7 @@
               </a:ln>
               <a:extLst>
                 <a:ext uri="{91240B29-F687-4f45-9708-019B960494DF}">
-                  <a14:hiddenLine xmlns:a14="http://schemas.microsoft.com/office/drawing/2010/main" xmlns="" w="9525">
+                  <a14:hiddenLine xmlns="" xmlns:a14="http://schemas.microsoft.com/office/drawing/2010/main" w="9525">
                     <a:solidFill>
                       <a:srgbClr val="000000"/>
                     </a:solidFill>
@@ -10835,7 +10835,7 @@
               </a:ln>
               <a:extLst>
                 <a:ext uri="{91240B29-F687-4f45-9708-019B960494DF}">
-                  <a14:hiddenLine xmlns:a14="http://schemas.microsoft.com/office/drawing/2010/main" xmlns="" w="9525">
+                  <a14:hiddenLine xmlns="" xmlns:a14="http://schemas.microsoft.com/office/drawing/2010/main" w="9525">
                     <a:solidFill>
                       <a:srgbClr val="000000"/>
                     </a:solidFill>
@@ -10925,7 +10925,7 @@
               </a:ln>
               <a:extLst>
                 <a:ext uri="{91240B29-F687-4f45-9708-019B960494DF}">
-                  <a14:hiddenLine xmlns:a14="http://schemas.microsoft.com/office/drawing/2010/main" xmlns="" w="9525">
+                  <a14:hiddenLine xmlns="" xmlns:a14="http://schemas.microsoft.com/office/drawing/2010/main" w="9525">
                     <a:solidFill>
                       <a:srgbClr val="000000"/>
                     </a:solidFill>
@@ -10990,7 +10990,7 @@
               </a:ln>
               <a:extLst>
                 <a:ext uri="{91240B29-F687-4f45-9708-019B960494DF}">
-                  <a14:hiddenLine xmlns:a14="http://schemas.microsoft.com/office/drawing/2010/main" xmlns="" w="9525">
+                  <a14:hiddenLine xmlns="" xmlns:a14="http://schemas.microsoft.com/office/drawing/2010/main" w="9525">
                     <a:solidFill>
                       <a:srgbClr val="000000"/>
                     </a:solidFill>
@@ -11110,7 +11110,7 @@
               </a:ln>
               <a:extLst>
                 <a:ext uri="{91240B29-F687-4f45-9708-019B960494DF}">
-                  <a14:hiddenLine xmlns:a14="http://schemas.microsoft.com/office/drawing/2010/main" xmlns="" w="9525">
+                  <a14:hiddenLine xmlns="" xmlns:a14="http://schemas.microsoft.com/office/drawing/2010/main" w="9525">
                     <a:solidFill>
                       <a:srgbClr val="000000"/>
                     </a:solidFill>
@@ -11208,7 +11208,7 @@
               </a:ln>
               <a:extLst>
                 <a:ext uri="{91240B29-F687-4f45-9708-019B960494DF}">
-                  <a14:hiddenLine xmlns:a14="http://schemas.microsoft.com/office/drawing/2010/main" xmlns="" w="9525">
+                  <a14:hiddenLine xmlns="" xmlns:a14="http://schemas.microsoft.com/office/drawing/2010/main" w="9525">
                     <a:solidFill>
                       <a:srgbClr val="000000"/>
                     </a:solidFill>
@@ -11323,7 +11323,7 @@
               </a:ln>
               <a:extLst>
                 <a:ext uri="{91240B29-F687-4f45-9708-019B960494DF}">
-                  <a14:hiddenLine xmlns:a14="http://schemas.microsoft.com/office/drawing/2010/main" xmlns="" w="9525">
+                  <a14:hiddenLine xmlns="" xmlns:a14="http://schemas.microsoft.com/office/drawing/2010/main" w="9525">
                     <a:solidFill>
                       <a:srgbClr val="000000"/>
                     </a:solidFill>
@@ -11413,7 +11413,7 @@
               </a:ln>
               <a:extLst>
                 <a:ext uri="{91240B29-F687-4f45-9708-019B960494DF}">
-                  <a14:hiddenLine xmlns:a14="http://schemas.microsoft.com/office/drawing/2010/main" xmlns="" w="9525">
+                  <a14:hiddenLine xmlns="" xmlns:a14="http://schemas.microsoft.com/office/drawing/2010/main" w="9525">
                     <a:solidFill>
                       <a:srgbClr val="000000"/>
                     </a:solidFill>
@@ -11478,7 +11478,7 @@
               </a:ln>
               <a:extLst>
                 <a:ext uri="{91240B29-F687-4f45-9708-019B960494DF}">
-                  <a14:hiddenLine xmlns:a14="http://schemas.microsoft.com/office/drawing/2010/main" xmlns="" w="9525">
+                  <a14:hiddenLine xmlns="" xmlns:a14="http://schemas.microsoft.com/office/drawing/2010/main" w="9525">
                     <a:solidFill>
                       <a:srgbClr val="000000"/>
                     </a:solidFill>
@@ -11568,7 +11568,7 @@
               </a:ln>
               <a:extLst>
                 <a:ext uri="{91240B29-F687-4f45-9708-019B960494DF}">
-                  <a14:hiddenLine xmlns:a14="http://schemas.microsoft.com/office/drawing/2010/main" xmlns="" w="9525">
+                  <a14:hiddenLine xmlns="" xmlns:a14="http://schemas.microsoft.com/office/drawing/2010/main" w="9525">
                     <a:solidFill>
                       <a:srgbClr val="000000"/>
                     </a:solidFill>
@@ -11636,7 +11636,7 @@
               </a:ln>
               <a:extLst>
                 <a:ext uri="{91240B29-F687-4f45-9708-019B960494DF}">
-                  <a14:hiddenLine xmlns:a14="http://schemas.microsoft.com/office/drawing/2010/main" xmlns="" w="9525">
+                  <a14:hiddenLine xmlns="" xmlns:a14="http://schemas.microsoft.com/office/drawing/2010/main" w="9525">
                     <a:solidFill>
                       <a:srgbClr val="000000"/>
                     </a:solidFill>
@@ -11726,7 +11726,7 @@
               </a:ln>
               <a:extLst>
                 <a:ext uri="{91240B29-F687-4f45-9708-019B960494DF}">
-                  <a14:hiddenLine xmlns:a14="http://schemas.microsoft.com/office/drawing/2010/main" xmlns="" w="9525">
+                  <a14:hiddenLine xmlns="" xmlns:a14="http://schemas.microsoft.com/office/drawing/2010/main" w="9525">
                     <a:solidFill>
                       <a:srgbClr val="000000"/>
                     </a:solidFill>
@@ -11794,7 +11794,7 @@
               </a:ln>
               <a:extLst>
                 <a:ext uri="{91240B29-F687-4f45-9708-019B960494DF}">
-                  <a14:hiddenLine xmlns:a14="http://schemas.microsoft.com/office/drawing/2010/main" xmlns="" w="9525">
+                  <a14:hiddenLine xmlns="" xmlns:a14="http://schemas.microsoft.com/office/drawing/2010/main" w="9525">
                     <a:solidFill>
                       <a:srgbClr val="000000"/>
                     </a:solidFill>
@@ -11884,7 +11884,7 @@
               </a:ln>
               <a:extLst>
                 <a:ext uri="{91240B29-F687-4f45-9708-019B960494DF}">
-                  <a14:hiddenLine xmlns:a14="http://schemas.microsoft.com/office/drawing/2010/main" xmlns="" w="9525">
+                  <a14:hiddenLine xmlns="" xmlns:a14="http://schemas.microsoft.com/office/drawing/2010/main" w="9525">
                     <a:solidFill>
                       <a:srgbClr val="000000"/>
                     </a:solidFill>
@@ -11918,7 +11918,7 @@
               </a:ln>
               <a:extLst>
                 <a:ext uri="{91240B29-F687-4f45-9708-019B960494DF}">
-                  <a14:hiddenLine xmlns:a14="http://schemas.microsoft.com/office/drawing/2010/main" xmlns="" w="9525">
+                  <a14:hiddenLine xmlns="" xmlns:a14="http://schemas.microsoft.com/office/drawing/2010/main" w="9525">
                     <a:solidFill>
                       <a:srgbClr val="000000"/>
                     </a:solidFill>
@@ -13930,7 +13930,21 @@
                 <a:latin typeface="Arial" panose="020B0604020202020204" pitchFamily="34" charset="0"/>
                 <a:cs typeface="Arial" panose="020B0604020202020204" pitchFamily="34" charset="0"/>
               </a:rPr>
-              <a:t>Bugs and crashes. </a:t>
+              <a:t>It is </a:t>
+            </a:r>
+            <a:r>
+              <a:rPr lang="en-US">
+                <a:latin typeface="Arial" panose="020B0604020202020204" pitchFamily="34" charset="0"/>
+                <a:cs typeface="Arial" panose="020B0604020202020204" pitchFamily="34" charset="0"/>
+              </a:rPr>
+              <a:t>prone to crashes</a:t>
+            </a:r>
+            <a:r>
+              <a:rPr lang="en-US" dirty="0">
+                <a:latin typeface="Arial" panose="020B0604020202020204" pitchFamily="34" charset="0"/>
+                <a:cs typeface="Arial" panose="020B0604020202020204" pitchFamily="34" charset="0"/>
+              </a:rPr>
+              <a:t>. </a:t>
             </a:r>
           </a:p>
           <a:p>

</xml_diff>